<commit_message>
EY - DE - Interview Question -9 - Answer
</commit_message>
<xml_diff>
--- a/Null/Null_Chapter_Question_4_Answer.pptx
+++ b/Null/Null_Chapter_Question_4_Answer.pptx
@@ -460,7 +460,7 @@
             <a:fld id="{5923F103-BC34-4FE4-A40E-EDDEECFDA5D0}" type="datetimeFigureOut">
               <a:rPr lang="en-US" smtClean="0"/>
               <a:pPr/>
-              <a:t>18-Jan-25</a:t>
+              <a:t>22-Jan-25</a:t>
             </a:fld>
             <a:endParaRPr lang="en-US" dirty="0"/>
           </a:p>
@@ -1549,7 +1549,7 @@
           <a:p>
             <a:fld id="{923A1CC3-2375-41D4-9E03-427CAF2A4C1A}" type="datetimeFigureOut">
               <a:rPr lang="en-US" smtClean="0"/>
-              <a:t>18-Jan-25</a:t>
+              <a:t>22-Jan-25</a:t>
             </a:fld>
             <a:endParaRPr lang="en-US" dirty="0"/>
           </a:p>
@@ -2530,7 +2530,7 @@
           <a:p>
             <a:fld id="{AFF16868-8199-4C2C-A5B1-63AEE139F88E}" type="datetimeFigureOut">
               <a:rPr lang="en-US" smtClean="0"/>
-              <a:t>18-Jan-25</a:t>
+              <a:t>22-Jan-25</a:t>
             </a:fld>
             <a:endParaRPr lang="en-US" dirty="0"/>
           </a:p>
@@ -3665,7 +3665,7 @@
           <a:p>
             <a:fld id="{AAD9FF7F-6988-44CC-821B-644E70CD2F73}" type="datetimeFigureOut">
               <a:rPr lang="en-US" smtClean="0"/>
-              <a:t>18-Jan-25</a:t>
+              <a:t>22-Jan-25</a:t>
             </a:fld>
             <a:endParaRPr lang="en-US" dirty="0"/>
           </a:p>
@@ -4699,7 +4699,7 @@
           <a:p>
             <a:fld id="{2BE451C3-0FF4-47C4-B829-773ADF60F88C}" type="datetimeFigureOut">
               <a:rPr lang="en-US" smtClean="0"/>
-              <a:t>18-Jan-25</a:t>
+              <a:t>22-Jan-25</a:t>
             </a:fld>
             <a:endParaRPr lang="en-US" dirty="0"/>
           </a:p>
@@ -5361,7 +5361,7 @@
           <a:p>
             <a:fld id="{9FE86839-B9D8-4651-8783-F325ECE74E65}" type="datetimeFigureOut">
               <a:rPr lang="en-US" smtClean="0"/>
-              <a:t>18-Jan-25</a:t>
+              <a:t>22-Jan-25</a:t>
             </a:fld>
             <a:endParaRPr lang="en-US" dirty="0"/>
           </a:p>
@@ -6223,7 +6223,7 @@
           <a:p>
             <a:fld id="{FD484F64-32F6-45C5-931F-ADC1662401D0}" type="datetimeFigureOut">
               <a:rPr lang="en-US" smtClean="0"/>
-              <a:t>18-Jan-25</a:t>
+              <a:t>22-Jan-25</a:t>
             </a:fld>
             <a:endParaRPr lang="en-US" dirty="0"/>
           </a:p>
@@ -6414,7 +6414,7 @@
           <a:p>
             <a:fld id="{53086D93-FCAC-47E0-A2EE-787E62CA814C}" type="datetimeFigureOut">
               <a:rPr lang="en-US" smtClean="0"/>
-              <a:t>18-Jan-25</a:t>
+              <a:t>22-Jan-25</a:t>
             </a:fld>
             <a:endParaRPr lang="en-US" dirty="0"/>
           </a:p>
@@ -7387,7 +7387,7 @@
           <a:p>
             <a:fld id="{CDA879A6-0FD0-4734-A311-86BFCA472E6E}" type="datetimeFigureOut">
               <a:rPr lang="en-US" smtClean="0"/>
-              <a:t>18-Jan-25</a:t>
+              <a:t>22-Jan-25</a:t>
             </a:fld>
             <a:endParaRPr lang="en-US" dirty="0"/>
           </a:p>
@@ -7599,7 +7599,7 @@
           <a:p>
             <a:fld id="{19C9CA7B-DFD4-44B5-8C60-D14B8CD1FB59}" type="datetimeFigureOut">
               <a:rPr lang="en-US" smtClean="0"/>
-              <a:t>18-Jan-25</a:t>
+              <a:t>22-Jan-25</a:t>
             </a:fld>
             <a:endParaRPr lang="en-US" dirty="0"/>
           </a:p>
@@ -8634,7 +8634,7 @@
           <a:p>
             <a:fld id="{F34E6425-0181-43F2-84FC-787E803FD2F8}" type="datetimeFigureOut">
               <a:rPr lang="en-US" smtClean="0"/>
-              <a:t>18-Jan-25</a:t>
+              <a:t>22-Jan-25</a:t>
             </a:fld>
             <a:endParaRPr lang="en-US" dirty="0"/>
           </a:p>
@@ -8907,7 +8907,7 @@
           <a:p>
             <a:fld id="{3BDB8791-F1B0-41E7-B7FD-A781E65C4266}" type="datetimeFigureOut">
               <a:rPr lang="en-US" smtClean="0"/>
-              <a:t>18-Jan-25</a:t>
+              <a:t>22-Jan-25</a:t>
             </a:fld>
             <a:endParaRPr lang="en-US" dirty="0"/>
           </a:p>
@@ -9318,7 +9318,7 @@
           <a:p>
             <a:fld id="{5FDD63B2-E120-4ED8-B27B-C685F510A5FE}" type="datetimeFigureOut">
               <a:rPr lang="en-US" smtClean="0"/>
-              <a:t>18-Jan-25</a:t>
+              <a:t>22-Jan-25</a:t>
             </a:fld>
             <a:endParaRPr lang="en-US" dirty="0"/>
           </a:p>
@@ -9446,7 +9446,7 @@
           <a:p>
             <a:fld id="{7AA18ACC-A947-437B-A130-35BD54FDF1E9}" type="datetimeFigureOut">
               <a:rPr lang="en-US" smtClean="0"/>
-              <a:t>18-Jan-25</a:t>
+              <a:t>22-Jan-25</a:t>
             </a:fld>
             <a:endParaRPr lang="en-US" dirty="0"/>
           </a:p>
@@ -9542,7 +9542,7 @@
           <a:p>
             <a:fld id="{7C8D7E02-BCB8-4D50-A234-369438C08659}" type="datetimeFigureOut">
               <a:rPr lang="en-US" smtClean="0"/>
-              <a:t>18-Jan-25</a:t>
+              <a:t>22-Jan-25</a:t>
             </a:fld>
             <a:endParaRPr lang="en-US" dirty="0"/>
           </a:p>
@@ -10624,7 +10624,7 @@
           <a:p>
             <a:fld id="{76E86A4C-8E40-4F87-A4F0-01A0687C5742}" type="datetimeFigureOut">
               <a:rPr lang="en-US" smtClean="0"/>
-              <a:t>18-Jan-25</a:t>
+              <a:t>22-Jan-25</a:t>
             </a:fld>
             <a:endParaRPr lang="en-US" dirty="0"/>
           </a:p>
@@ -11733,7 +11733,7 @@
           <a:p>
             <a:fld id="{35E72C73-2D91-4E12-BA25-F0AA0C03599B}" type="datetimeFigureOut">
               <a:rPr lang="en-US" smtClean="0"/>
-              <a:t>18-Jan-25</a:t>
+              <a:t>22-Jan-25</a:t>
             </a:fld>
             <a:endParaRPr lang="en-US" dirty="0"/>
           </a:p>
@@ -12731,7 +12731,7 @@
           <a:p>
             <a:fld id="{2BE451C3-0FF4-47C4-B829-773ADF60F88C}" type="datetimeFigureOut">
               <a:rPr lang="en-US" smtClean="0"/>
-              <a:t>18-Jan-25</a:t>
+              <a:t>22-Jan-25</a:t>
             </a:fld>
             <a:endParaRPr lang="en-US" dirty="0"/>
           </a:p>
@@ -13615,7 +13615,7 @@
                   <a:srgbClr val="FFFF00"/>
                 </a:solidFill>
               </a:rPr>
-              <a:t>What does query this query return?</a:t>
+              <a:t>What does this query return?</a:t>
             </a:r>
           </a:p>
         </p:txBody>

</xml_diff>